<commit_message>
added pdf and power BI link
</commit_message>
<xml_diff>
--- a/HEART DISEASE ANALYSIS.pptx
+++ b/HEART DISEASE ANALYSIS.pptx
@@ -8750,7 +8750,7 @@
         </p:spPr>
         <p:txBody>
           <a:bodyPr>
-            <a:normAutofit fontScale="70000" lnSpcReduction="20000"/>
+            <a:normAutofit fontScale="62500" lnSpcReduction="20000"/>
           </a:bodyPr>
           <a:lstStyle/>
           <a:p>
@@ -8876,9 +8876,38 @@
               </a:rPr>
               <a:t>We can observe from here that ST depression mostly increases between the age group of 30-40.</a:t>
             </a:r>
-            <a:endParaRPr lang="en-IN" dirty="0">
+          </a:p>
+          <a:p>
+            <a:pPr marL="0" indent="0">
+              <a:buNone/>
+            </a:pPr>
+            <a:r>
+              <a:rPr lang="en-US" dirty="0">
+                <a:solidFill>
+                  <a:schemeClr val="bg1"/>
+                </a:solidFill>
+                <a:latin typeface="Aptos" panose="020B0004020202020204" pitchFamily="34" charset="0"/>
+              </a:rPr>
+              <a:t>Power BI Link: </a:t>
+            </a:r>
+            <a:r>
+              <a:rPr lang="en-US" u="sng" dirty="0">
+                <a:solidFill>
+                  <a:schemeClr val="accent1">
+                    <a:lumMod val="40000"/>
+                    <a:lumOff val="60000"/>
+                  </a:schemeClr>
+                </a:solidFill>
+                <a:latin typeface="Aptos" panose="020B0004020202020204" pitchFamily="34" charset="0"/>
+              </a:rPr>
+              <a:t>https://app.powerbi.com/links/vYyIW7r-cD?ctid=209a70f5-a678-4831-9798-ea1ea04aa9b8&amp;pbi_source=linkShare</a:t>
+            </a:r>
+            <a:endParaRPr lang="en-IN" u="sng" dirty="0">
               <a:solidFill>
-                <a:schemeClr val="bg1"/>
+                <a:schemeClr val="accent1">
+                  <a:lumMod val="40000"/>
+                  <a:lumOff val="60000"/>
+                </a:schemeClr>
               </a:solidFill>
               <a:latin typeface="Aptos" panose="020B0004020202020204" pitchFamily="34" charset="0"/>
             </a:endParaRPr>

</xml_diff>